<commit_message>
MAJ du notebook et du support pour simplification des visualisations
</commit_message>
<xml_diff>
--- a/speed_dating.pptx
+++ b/speed_dating.pptx
@@ -207,7 +207,7 @@
           <a:p>
             <a:fld id="{6BE93D47-2100-4520-A674-42720C878824}" type="datetimeFigureOut">
               <a:rPr lang="fr-FR" smtClean="0"/>
-              <a:t>02/01/2026</a:t>
+              <a:t>04/01/2026</a:t>
             </a:fld>
             <a:endParaRPr lang="fr-FR"/>
           </a:p>
@@ -621,7 +621,7 @@
           <a:p>
             <a:fld id="{C990D2F3-07B2-4556-8EEA-239F868A8816}" type="datetime1">
               <a:rPr lang="fr-FR" smtClean="0"/>
-              <a:t>02/01/2026</a:t>
+              <a:t>04/01/2026</a:t>
             </a:fld>
             <a:endParaRPr lang="fr-FR"/>
           </a:p>
@@ -819,7 +819,7 @@
           <a:p>
             <a:fld id="{05420883-C1CF-45DB-8E21-27E9BFE30BA5}" type="datetime1">
               <a:rPr lang="fr-FR" smtClean="0"/>
-              <a:t>02/01/2026</a:t>
+              <a:t>04/01/2026</a:t>
             </a:fld>
             <a:endParaRPr lang="fr-FR"/>
           </a:p>
@@ -1027,7 +1027,7 @@
           <a:p>
             <a:fld id="{8BCD79BF-A261-454E-886D-ACA8EFF7026B}" type="datetime1">
               <a:rPr lang="fr-FR" smtClean="0"/>
-              <a:t>02/01/2026</a:t>
+              <a:t>04/01/2026</a:t>
             </a:fld>
             <a:endParaRPr lang="fr-FR"/>
           </a:p>
@@ -1225,7 +1225,7 @@
           <a:p>
             <a:fld id="{9B3ED75C-5995-486D-AEC2-3458EE0A8C85}" type="datetime1">
               <a:rPr lang="fr-FR" smtClean="0"/>
-              <a:t>02/01/2026</a:t>
+              <a:t>04/01/2026</a:t>
             </a:fld>
             <a:endParaRPr lang="fr-FR"/>
           </a:p>
@@ -1500,7 +1500,7 @@
           <a:p>
             <a:fld id="{25F812E0-011E-482D-9770-26F1A780EAD8}" type="datetime1">
               <a:rPr lang="fr-FR" smtClean="0"/>
-              <a:t>02/01/2026</a:t>
+              <a:t>04/01/2026</a:t>
             </a:fld>
             <a:endParaRPr lang="fr-FR"/>
           </a:p>
@@ -1765,7 +1765,7 @@
           <a:p>
             <a:fld id="{F303FC8A-FDB1-4451-9329-43DBB912A256}" type="datetime1">
               <a:rPr lang="fr-FR" smtClean="0"/>
-              <a:t>02/01/2026</a:t>
+              <a:t>04/01/2026</a:t>
             </a:fld>
             <a:endParaRPr lang="fr-FR"/>
           </a:p>
@@ -2177,7 +2177,7 @@
           <a:p>
             <a:fld id="{855938DB-53C5-499F-9E77-C4A6BFB6D7B0}" type="datetime1">
               <a:rPr lang="fr-FR" smtClean="0"/>
-              <a:t>02/01/2026</a:t>
+              <a:t>04/01/2026</a:t>
             </a:fld>
             <a:endParaRPr lang="fr-FR"/>
           </a:p>
@@ -2318,7 +2318,7 @@
           <a:p>
             <a:fld id="{5664754B-8D12-4F7B-B7B2-BE9501C2BF0C}" type="datetime1">
               <a:rPr lang="fr-FR" smtClean="0"/>
-              <a:t>02/01/2026</a:t>
+              <a:t>04/01/2026</a:t>
             </a:fld>
             <a:endParaRPr lang="fr-FR"/>
           </a:p>
@@ -2431,7 +2431,7 @@
           <a:p>
             <a:fld id="{A2D601FE-0B10-4357-8A94-ED43ECC61E73}" type="datetime1">
               <a:rPr lang="fr-FR" smtClean="0"/>
-              <a:t>02/01/2026</a:t>
+              <a:t>04/01/2026</a:t>
             </a:fld>
             <a:endParaRPr lang="fr-FR"/>
           </a:p>
@@ -2742,7 +2742,7 @@
           <a:p>
             <a:fld id="{4A15B53D-237A-4F39-87AD-DBFD4AA32F74}" type="datetime1">
               <a:rPr lang="fr-FR" smtClean="0"/>
-              <a:t>02/01/2026</a:t>
+              <a:t>04/01/2026</a:t>
             </a:fld>
             <a:endParaRPr lang="fr-FR"/>
           </a:p>
@@ -3030,7 +3030,7 @@
           <a:p>
             <a:fld id="{F16A35C9-E3D3-49A9-95FC-FD5ECA9EB791}" type="datetime1">
               <a:rPr lang="fr-FR" smtClean="0"/>
-              <a:t>02/01/2026</a:t>
+              <a:t>04/01/2026</a:t>
             </a:fld>
             <a:endParaRPr lang="fr-FR"/>
           </a:p>
@@ -3271,7 +3271,7 @@
           <a:p>
             <a:fld id="{96C75ECC-67CD-476B-B935-1BA4B425F864}" type="datetime1">
               <a:rPr lang="fr-FR" smtClean="0"/>
-              <a:t>02/01/2026</a:t>
+              <a:t>04/01/2026</a:t>
             </a:fld>
             <a:endParaRPr lang="fr-FR"/>
           </a:p>
@@ -4080,10 +4080,10 @@
       </p:grpSpPr>
       <p:pic>
         <p:nvPicPr>
-          <p:cNvPr id="7" name="Image 6" descr="Une image contenant texte, capture d’écran, diagramme, Police&#10;&#10;Le contenu généré par l’IA peut être incorrect.">
-            <a:extLst>
-              <a:ext uri="{FF2B5EF4-FFF2-40B4-BE49-F238E27FC236}">
-                <a16:creationId xmlns:a16="http://schemas.microsoft.com/office/drawing/2014/main" id="{3772AF3A-4DA3-E7A6-AE88-860F2C0900A3}"/>
+          <p:cNvPr id="10" name="Image 9" descr="Une image contenant texte, capture d’écran, diagramme, cercle&#10;&#10;Le contenu généré par l’IA peut être incorrect.">
+            <a:extLst>
+              <a:ext uri="{FF2B5EF4-FFF2-40B4-BE49-F238E27FC236}">
+                <a16:creationId xmlns:a16="http://schemas.microsoft.com/office/drawing/2014/main" id="{8D1705BF-A249-6B2A-92A3-3346B01A92E0}"/>
               </a:ext>
             </a:extLst>
           </p:cNvPr>
@@ -4100,8 +4100,38 @@
         </p:blipFill>
         <p:spPr>
           <a:xfrm>
-            <a:off x="6445231" y="304635"/>
-            <a:ext cx="5614092" cy="3399863"/>
+            <a:off x="7320455" y="3598132"/>
+            <a:ext cx="4072760" cy="3210800"/>
+          </a:xfrm>
+          <a:prstGeom prst="rect">
+            <a:avLst/>
+          </a:prstGeom>
+        </p:spPr>
+      </p:pic>
+      <p:pic>
+        <p:nvPicPr>
+          <p:cNvPr id="6" name="Image 5" descr="Une image contenant texte, capture d’écran, diagramme, Police&#10;&#10;Le contenu généré par l’IA peut être incorrect.">
+            <a:extLst>
+              <a:ext uri="{FF2B5EF4-FFF2-40B4-BE49-F238E27FC236}">
+                <a16:creationId xmlns:a16="http://schemas.microsoft.com/office/drawing/2014/main" id="{B12E0153-BFCE-8561-DC8A-4BD560C16A55}"/>
+              </a:ext>
+            </a:extLst>
+          </p:cNvPr>
+          <p:cNvPicPr>
+            <a:picLocks noChangeAspect="1"/>
+          </p:cNvPicPr>
+          <p:nvPr/>
+        </p:nvPicPr>
+        <p:blipFill>
+          <a:blip r:embed="rId3"/>
+          <a:stretch>
+            <a:fillRect/>
+          </a:stretch>
+        </p:blipFill>
+        <p:spPr>
+          <a:xfrm>
+            <a:off x="6760033" y="361106"/>
+            <a:ext cx="5163743" cy="3127134"/>
           </a:xfrm>
           <a:prstGeom prst="rect">
             <a:avLst/>
@@ -4225,36 +4255,6 @@
           </a:p>
         </p:txBody>
       </p:sp>
-      <p:pic>
-        <p:nvPicPr>
-          <p:cNvPr id="8" name="Image 7" descr="Une image contenant texte, capture d’écran, diagramme, cercle&#10;&#10;Le contenu généré par l’IA peut être incorrect.">
-            <a:extLst>
-              <a:ext uri="{FF2B5EF4-FFF2-40B4-BE49-F238E27FC236}">
-                <a16:creationId xmlns:a16="http://schemas.microsoft.com/office/drawing/2014/main" id="{D44D1E98-E545-E482-0C7E-7A65C896699C}"/>
-              </a:ext>
-            </a:extLst>
-          </p:cNvPr>
-          <p:cNvPicPr>
-            <a:picLocks noChangeAspect="1"/>
-          </p:cNvPicPr>
-          <p:nvPr/>
-        </p:nvPicPr>
-        <p:blipFill>
-          <a:blip r:embed="rId3"/>
-          <a:stretch>
-            <a:fillRect/>
-          </a:stretch>
-        </p:blipFill>
-        <p:spPr>
-          <a:xfrm>
-            <a:off x="7496650" y="3779665"/>
-            <a:ext cx="4033933" cy="3127134"/>
-          </a:xfrm>
-          <a:prstGeom prst="rect">
-            <a:avLst/>
-          </a:prstGeom>
-        </p:spPr>
-      </p:pic>
       <p:sp>
         <p:nvSpPr>
           <p:cNvPr id="11" name="ZoneTexte 10">
@@ -4371,10 +4371,10 @@
       </p:sp>
       <p:pic>
         <p:nvPicPr>
-          <p:cNvPr id="14" name="Image 13" descr="Une image contenant texte, capture d’écran, diagramme, cercle&#10;&#10;Le contenu généré par l’IA peut être incorrect.">
-            <a:extLst>
-              <a:ext uri="{FF2B5EF4-FFF2-40B4-BE49-F238E27FC236}">
-                <a16:creationId xmlns:a16="http://schemas.microsoft.com/office/drawing/2014/main" id="{F90084D6-5F86-CCC5-406E-393E779DB406}"/>
+          <p:cNvPr id="13" name="Image 12" descr="Une image contenant texte, capture d’écran, diagramme, cercle&#10;&#10;Le contenu généré par l’IA peut être incorrect.">
+            <a:extLst>
+              <a:ext uri="{FF2B5EF4-FFF2-40B4-BE49-F238E27FC236}">
+                <a16:creationId xmlns:a16="http://schemas.microsoft.com/office/drawing/2014/main" id="{6CA9983F-BD7B-F473-F3B9-3AB21AD4C75C}"/>
               </a:ext>
             </a:extLst>
           </p:cNvPr>
@@ -4391,8 +4391,8 @@
         </p:blipFill>
         <p:spPr>
           <a:xfrm>
-            <a:off x="1940169" y="3535523"/>
-            <a:ext cx="4853285" cy="3281745"/>
+            <a:off x="1889608" y="3603448"/>
+            <a:ext cx="4502538" cy="3044573"/>
           </a:xfrm>
           <a:prstGeom prst="rect">
             <a:avLst/>
@@ -4527,7 +4527,7 @@
         </p:nvSpPr>
         <p:spPr>
           <a:xfrm>
-            <a:off x="592836" y="165834"/>
+            <a:off x="661153" y="165834"/>
             <a:ext cx="11006328" cy="6555641"/>
           </a:xfrm>
           <a:prstGeom prst="rect">
@@ -4585,7 +4585,7 @@
           <a:p>
             <a:r>
               <a:rPr lang="fr-FR" sz="1400" b="1" dirty="0"/>
-              <a:t>Objectif initial</a:t>
+              <a:t>Objectif initial:</a:t>
             </a:r>
             <a:r>
               <a:rPr lang="fr-FR" sz="1400" dirty="0"/>
@@ -4621,6 +4621,10 @@
             <a:endParaRPr lang="fr-FR" sz="1400" dirty="0"/>
           </a:p>
           <a:p>
+            <a:pPr marL="285750" indent="-285750">
+              <a:buFont typeface="Arial" panose="020B0604020202020204" pitchFamily="34" charset="0"/>
+              <a:buChar char="•"/>
+            </a:pPr>
             <a:r>
               <a:rPr lang="fr-FR" sz="1400" b="1" dirty="0"/>
               <a:t>Données insuffisantes</a:t>
@@ -4656,6 +4660,10 @@
             <a:endParaRPr lang="fr-FR" sz="1400" b="1" dirty="0"/>
           </a:p>
           <a:p>
+            <a:pPr marL="285750" indent="-285750">
+              <a:buFont typeface="Arial" panose="020B0604020202020204" pitchFamily="34" charset="0"/>
+              <a:buChar char="•"/>
+            </a:pPr>
             <a:r>
               <a:rPr lang="fr-FR" sz="1400" b="1" dirty="0"/>
               <a:t>Contexte inadapté</a:t>
@@ -4692,6 +4700,10 @@
             <a:endParaRPr lang="fr-FR" sz="1400" b="1" dirty="0"/>
           </a:p>
           <a:p>
+            <a:pPr marL="285750" indent="-285750">
+              <a:buFont typeface="Arial" panose="020B0604020202020204" pitchFamily="34" charset="0"/>
+              <a:buChar char="•"/>
+            </a:pPr>
             <a:r>
               <a:rPr lang="fr-FR" sz="1400" b="1" dirty="0"/>
               <a:t>Incohérences dans les données</a:t>
@@ -4940,8 +4952,8 @@
         </p:nvSpPr>
         <p:spPr>
           <a:xfrm>
-            <a:off x="2862072" y="1655064"/>
-            <a:ext cx="7719780" cy="3699090"/>
+            <a:off x="2427890" y="1655064"/>
+            <a:ext cx="8153962" cy="3699090"/>
           </a:xfrm>
           <a:prstGeom prst="rect">
             <a:avLst/>
@@ -5053,7 +5065,7 @@
               <a:rPr lang="fr-FR" b="0" dirty="0">
                 <a:effectLst/>
               </a:rPr>
-              <a:t> : 21 vagues aboutissant à 8378 rencontres  </a:t>
+              <a:t> : 21 vagues de rencontres aboutissant à 8378 rencontres  </a:t>
             </a:r>
           </a:p>
           <a:p>
@@ -5340,12 +5352,86 @@
           </a:prstGeom>
         </p:spPr>
       </p:pic>
+      <p:sp>
+        <p:nvSpPr>
+          <p:cNvPr id="16" name="ZoneTexte 15">
+            <a:extLst>
+              <a:ext uri="{FF2B5EF4-FFF2-40B4-BE49-F238E27FC236}">
+                <a16:creationId xmlns:a16="http://schemas.microsoft.com/office/drawing/2014/main" id="{3253C3D4-AC96-1139-5A15-C6A90402858E}"/>
+              </a:ext>
+            </a:extLst>
+          </p:cNvPr>
+          <p:cNvSpPr txBox="1"/>
+          <p:nvPr/>
+        </p:nvSpPr>
+        <p:spPr>
+          <a:xfrm>
+            <a:off x="854727" y="5026883"/>
+            <a:ext cx="7202895" cy="1754326"/>
+          </a:xfrm>
+          <a:prstGeom prst="rect">
+            <a:avLst/>
+          </a:prstGeom>
+          <a:noFill/>
+        </p:spPr>
+        <p:txBody>
+          <a:bodyPr wrap="square" rtlCol="0">
+            <a:spAutoFit/>
+          </a:bodyPr>
+          <a:lstStyle/>
+          <a:p>
+            <a:pPr marL="171450" indent="-171450">
+              <a:buFont typeface="Arial" panose="020B0604020202020204" pitchFamily="34" charset="0"/>
+              <a:buChar char="•"/>
+            </a:pPr>
+            <a:r>
+              <a:rPr lang="fr-FR" dirty="0"/>
+              <a:t>551 participants.</a:t>
+            </a:r>
+          </a:p>
+          <a:p>
+            <a:pPr marL="171450" indent="-171450">
+              <a:buFont typeface="Arial" panose="020B0604020202020204" pitchFamily="34" charset="0"/>
+              <a:buChar char="•"/>
+            </a:pPr>
+            <a:r>
+              <a:rPr lang="fr-FR" dirty="0"/>
+              <a:t>parité Hommes / Femmes respectée.</a:t>
+            </a:r>
+          </a:p>
+          <a:p>
+            <a:pPr marL="171450" indent="-171450">
+              <a:buFont typeface="Arial" panose="020B0604020202020204" pitchFamily="34" charset="0"/>
+              <a:buChar char="•"/>
+            </a:pPr>
+            <a:r>
+              <a:rPr lang="fr-FR" dirty="0"/>
+              <a:t>âges des participants dans la même tranche (moins de 30 ans) mis à part 3 exceptions chez les hommes et 3 chez les femmes (non significatifs)</a:t>
+            </a:r>
+          </a:p>
+          <a:p>
+            <a:pPr marL="171450" indent="-171450">
+              <a:buFont typeface="Arial" panose="020B0604020202020204" pitchFamily="34" charset="0"/>
+              <a:buChar char="•"/>
+            </a:pPr>
+            <a:r>
+              <a:rPr lang="fr-FR" dirty="0"/>
+              <a:t>métiers principalement dans le domaine tertiaire ce qui est probablement lié à la localisation des speed </a:t>
+            </a:r>
+            <a:r>
+              <a:rPr lang="fr-FR" dirty="0" err="1"/>
+              <a:t>datings</a:t>
+            </a:r>
+            <a:endParaRPr lang="fr-FR" dirty="0"/>
+          </a:p>
+        </p:txBody>
+      </p:sp>
       <p:pic>
         <p:nvPicPr>
-          <p:cNvPr id="15" name="Image 14" descr="Une image contenant texte, capture d’écran, logiciel, nombre&#10;&#10;Le contenu généré par l’IA peut être incorrect.">
-            <a:extLst>
-              <a:ext uri="{FF2B5EF4-FFF2-40B4-BE49-F238E27FC236}">
-                <a16:creationId xmlns:a16="http://schemas.microsoft.com/office/drawing/2014/main" id="{D8C04F29-22E8-DEBC-D79D-00A4C0845CDC}"/>
+          <p:cNvPr id="4" name="Image 3" descr="Une image contenant texte, capture d’écran, cercle, diagramme&#10;&#10;Le contenu généré par l’IA peut être incorrect.">
+            <a:extLst>
+              <a:ext uri="{FF2B5EF4-FFF2-40B4-BE49-F238E27FC236}">
+                <a16:creationId xmlns:a16="http://schemas.microsoft.com/office/drawing/2014/main" id="{2A259F2F-5409-B187-8307-9C6F35AF707F}"/>
               </a:ext>
             </a:extLst>
           </p:cNvPr>
@@ -5362,94 +5448,20 @@
         </p:blipFill>
         <p:spPr>
           <a:xfrm>
-            <a:off x="41435" y="373634"/>
-            <a:ext cx="7647275" cy="4590510"/>
+            <a:off x="8566916" y="0"/>
+            <a:ext cx="3036506" cy="3035555"/>
           </a:xfrm>
           <a:prstGeom prst="rect">
             <a:avLst/>
           </a:prstGeom>
         </p:spPr>
       </p:pic>
-      <p:sp>
-        <p:nvSpPr>
-          <p:cNvPr id="16" name="ZoneTexte 15">
-            <a:extLst>
-              <a:ext uri="{FF2B5EF4-FFF2-40B4-BE49-F238E27FC236}">
-                <a16:creationId xmlns:a16="http://schemas.microsoft.com/office/drawing/2014/main" id="{3253C3D4-AC96-1139-5A15-C6A90402858E}"/>
-              </a:ext>
-            </a:extLst>
-          </p:cNvPr>
-          <p:cNvSpPr txBox="1"/>
-          <p:nvPr/>
-        </p:nvSpPr>
-        <p:spPr>
-          <a:xfrm>
-            <a:off x="854727" y="5026883"/>
-            <a:ext cx="7202895" cy="1754326"/>
-          </a:xfrm>
-          <a:prstGeom prst="rect">
-            <a:avLst/>
-          </a:prstGeom>
-          <a:noFill/>
-        </p:spPr>
-        <p:txBody>
-          <a:bodyPr wrap="square" rtlCol="0">
-            <a:spAutoFit/>
-          </a:bodyPr>
-          <a:lstStyle/>
-          <a:p>
-            <a:pPr marL="171450" indent="-171450">
-              <a:buFont typeface="Arial" panose="020B0604020202020204" pitchFamily="34" charset="0"/>
-              <a:buChar char="•"/>
-            </a:pPr>
-            <a:r>
-              <a:rPr lang="fr-FR" dirty="0"/>
-              <a:t>551 participants.</a:t>
-            </a:r>
-          </a:p>
-          <a:p>
-            <a:pPr marL="171450" indent="-171450">
-              <a:buFont typeface="Arial" panose="020B0604020202020204" pitchFamily="34" charset="0"/>
-              <a:buChar char="•"/>
-            </a:pPr>
-            <a:r>
-              <a:rPr lang="fr-FR" dirty="0"/>
-              <a:t>parité Hommes / Femmes respectée.</a:t>
-            </a:r>
-          </a:p>
-          <a:p>
-            <a:pPr marL="171450" indent="-171450">
-              <a:buFont typeface="Arial" panose="020B0604020202020204" pitchFamily="34" charset="0"/>
-              <a:buChar char="•"/>
-            </a:pPr>
-            <a:r>
-              <a:rPr lang="fr-FR" dirty="0"/>
-              <a:t>âges des participants dans la même tranche (moins de 30 ans) mis à part 3 exceptions chez les hommes et 3 chez les femmes (non significatifs)</a:t>
-            </a:r>
-          </a:p>
-          <a:p>
-            <a:pPr marL="171450" indent="-171450">
-              <a:buFont typeface="Arial" panose="020B0604020202020204" pitchFamily="34" charset="0"/>
-              <a:buChar char="•"/>
-            </a:pPr>
-            <a:r>
-              <a:rPr lang="fr-FR" dirty="0"/>
-              <a:t>métiers principalement dans le domaine tertiaire ce qui est probablement lié à la localisation des speed </a:t>
-            </a:r>
-            <a:r>
-              <a:rPr lang="fr-FR" dirty="0" err="1"/>
-              <a:t>datings</a:t>
-            </a:r>
-            <a:endParaRPr lang="fr-FR" dirty="0"/>
-          </a:p>
-        </p:txBody>
-      </p:sp>
       <p:pic>
         <p:nvPicPr>
-          <p:cNvPr id="4" name="Image 3" descr="Une image contenant texte, capture d’écran, cercle, diagramme&#10;&#10;Le contenu généré par l’IA peut être incorrect.">
-            <a:extLst>
-              <a:ext uri="{FF2B5EF4-FFF2-40B4-BE49-F238E27FC236}">
-                <a16:creationId xmlns:a16="http://schemas.microsoft.com/office/drawing/2014/main" id="{2A259F2F-5409-B187-8307-9C6F35AF707F}"/>
+          <p:cNvPr id="7" name="Image 6" descr="Une image contenant texte, capture d’écran, nombre, diagramme&#10;&#10;Le contenu généré par l’IA peut être incorrect.">
+            <a:extLst>
+              <a:ext uri="{FF2B5EF4-FFF2-40B4-BE49-F238E27FC236}">
+                <a16:creationId xmlns:a16="http://schemas.microsoft.com/office/drawing/2014/main" id="{AB30D73A-7783-BDD0-C59D-AC6969AC5801}"/>
               </a:ext>
             </a:extLst>
           </p:cNvPr>
@@ -5466,8 +5478,8 @@
         </p:blipFill>
         <p:spPr>
           <a:xfrm>
-            <a:off x="8566916" y="0"/>
-            <a:ext cx="3036506" cy="3035555"/>
+            <a:off x="154861" y="446124"/>
+            <a:ext cx="7757705" cy="4517412"/>
           </a:xfrm>
           <a:prstGeom prst="rect">
             <a:avLst/>
@@ -5618,7 +5630,7 @@
           <a:p>
             <a:r>
               <a:rPr lang="fr-FR" b="1" dirty="0"/>
-              <a:t>Axe d'analyse n°1: est ce que la notation des attributs chez le partenaire évolue au fil du temps?</a:t>
+              <a:t>Axe d'analyse n°1: est ce que la notation des critères chez le partenaire évolue au fil du temps?</a:t>
             </a:r>
             <a:endParaRPr lang="fr-FR" dirty="0"/>
           </a:p>
@@ -5627,36 +5639,87 @@
           </a:p>
         </p:txBody>
       </p:sp>
-      <p:pic>
-        <p:nvPicPr>
-          <p:cNvPr id="6" name="Image 5" descr="Une image contenant texte, capture d’écran, diagramme, ligne&#10;&#10;Le contenu généré par l’IA peut être incorrect.">
-            <a:extLst>
-              <a:ext uri="{FF2B5EF4-FFF2-40B4-BE49-F238E27FC236}">
-                <a16:creationId xmlns:a16="http://schemas.microsoft.com/office/drawing/2014/main" id="{5A736821-2ECF-797D-32AC-AEB041C64CFA}"/>
-              </a:ext>
-            </a:extLst>
-          </p:cNvPr>
-          <p:cNvPicPr>
-            <a:picLocks noChangeAspect="1"/>
-          </p:cNvPicPr>
+      <p:grpSp>
+        <p:nvGrpSpPr>
+          <p:cNvPr id="33" name="Groupe 32">
+            <a:extLst>
+              <a:ext uri="{FF2B5EF4-FFF2-40B4-BE49-F238E27FC236}">
+                <a16:creationId xmlns:a16="http://schemas.microsoft.com/office/drawing/2014/main" id="{15EB6CE1-79CA-A950-AA56-8C15B30E7F64}"/>
+              </a:ext>
+            </a:extLst>
+          </p:cNvPr>
+          <p:cNvGrpSpPr/>
           <p:nvPr/>
-        </p:nvPicPr>
-        <p:blipFill>
-          <a:blip r:embed="rId2"/>
-          <a:stretch>
-            <a:fillRect/>
-          </a:stretch>
-        </p:blipFill>
-        <p:spPr>
+        </p:nvGrpSpPr>
+        <p:grpSpPr>
           <a:xfrm>
-            <a:off x="2188464" y="684882"/>
-            <a:ext cx="8805672" cy="6036593"/>
+            <a:off x="556795" y="1061545"/>
+            <a:ext cx="11278105" cy="4829503"/>
+            <a:chOff x="630115" y="1702676"/>
+            <a:chExt cx="8566619" cy="3479101"/>
           </a:xfrm>
-          <a:prstGeom prst="rect">
-            <a:avLst/>
-          </a:prstGeom>
-        </p:spPr>
-      </p:pic>
+        </p:grpSpPr>
+        <p:pic>
+          <p:nvPicPr>
+            <p:cNvPr id="30" name="Image 29" descr="Une image contenant texte, capture d’écran, diagramme, Tracé&#10;&#10;Le contenu généré par l’IA peut être incorrect.">
+              <a:extLst>
+                <a:ext uri="{FF2B5EF4-FFF2-40B4-BE49-F238E27FC236}">
+                  <a16:creationId xmlns:a16="http://schemas.microsoft.com/office/drawing/2014/main" id="{B3A700A6-B168-FBA5-179F-A406B488AF90}"/>
+                </a:ext>
+              </a:extLst>
+            </p:cNvPr>
+            <p:cNvPicPr>
+              <a:picLocks noChangeAspect="1"/>
+            </p:cNvPicPr>
+            <p:nvPr/>
+          </p:nvPicPr>
+          <p:blipFill>
+            <a:blip r:embed="rId2"/>
+            <a:stretch>
+              <a:fillRect/>
+            </a:stretch>
+          </p:blipFill>
+          <p:spPr>
+            <a:xfrm>
+              <a:off x="630115" y="1781327"/>
+              <a:ext cx="3648102" cy="3400450"/>
+            </a:xfrm>
+            <a:prstGeom prst="rect">
+              <a:avLst/>
+            </a:prstGeom>
+          </p:spPr>
+        </p:pic>
+        <p:pic>
+          <p:nvPicPr>
+            <p:cNvPr id="32" name="Image 31" descr="Une image contenant texte, capture d’écran, diagramme, Tracé&#10;&#10;Le contenu généré par l’IA peut être incorrect.">
+              <a:extLst>
+                <a:ext uri="{FF2B5EF4-FFF2-40B4-BE49-F238E27FC236}">
+                  <a16:creationId xmlns:a16="http://schemas.microsoft.com/office/drawing/2014/main" id="{219A3C0E-7D32-0002-CD01-B6FD8D1D1776}"/>
+                </a:ext>
+              </a:extLst>
+            </p:cNvPr>
+            <p:cNvPicPr>
+              <a:picLocks noChangeAspect="1"/>
+            </p:cNvPicPr>
+            <p:nvPr/>
+          </p:nvPicPr>
+          <p:blipFill>
+            <a:blip r:embed="rId3"/>
+            <a:stretch>
+              <a:fillRect/>
+            </a:stretch>
+          </p:blipFill>
+          <p:spPr>
+            <a:xfrm>
+              <a:off x="4341498" y="1702676"/>
+              <a:ext cx="4855236" cy="3479101"/>
+            </a:xfrm>
+            <a:prstGeom prst="rect">
+              <a:avLst/>
+            </a:prstGeom>
+          </p:spPr>
+        </p:pic>
+      </p:grpSp>
     </p:spTree>
     <p:extLst>
       <p:ext uri="{BB962C8B-B14F-4D97-AF65-F5344CB8AC3E}">
@@ -5846,15 +5909,15 @@
             </a:pPr>
             <a:r>
               <a:rPr lang="fr-FR" dirty="0"/>
-              <a:t>L’</a:t>
+              <a:t>La </a:t>
             </a:r>
             <a:r>
               <a:rPr lang="fr-FR" b="1" dirty="0"/>
-              <a:t>attractivité physique</a:t>
+              <a:t>beauté </a:t>
             </a:r>
             <a:r>
               <a:rPr lang="fr-FR" dirty="0"/>
-              <a:t> demeure le critère dominant à tous les moments de mesure.</a:t>
+              <a:t>demeure le critère dominant à tous les moments de mesure.</a:t>
             </a:r>
           </a:p>
           <a:p>
@@ -5868,7 +5931,7 @@
             </a:r>
             <a:r>
               <a:rPr lang="fr-FR" b="1" dirty="0"/>
-              <a:t>« drôle »</a:t>
+              <a:t>« humour »</a:t>
             </a:r>
             <a:r>
               <a:rPr lang="fr-FR" dirty="0"/>
@@ -5898,7 +5961,7 @@
             </a:r>
             <a:r>
               <a:rPr lang="fr-FR" dirty="0"/>
-              <a:t>, traduisant une hiérarchie claire des préférences.</a:t>
+              <a:t>, traduisant une hiérarchisation claire des préférences.</a:t>
             </a:r>
           </a:p>
           <a:p>
@@ -5942,15 +6005,15 @@
             </a:pPr>
             <a:r>
               <a:rPr lang="fr-FR" dirty="0"/>
-              <a:t>À partir du speed dating, l’</a:t>
+              <a:t>À partir du speed dating, la </a:t>
             </a:r>
             <a:r>
               <a:rPr lang="fr-FR" b="1" dirty="0"/>
-              <a:t>attractivité physique</a:t>
+              <a:t>beauté </a:t>
             </a:r>
             <a:r>
               <a:rPr lang="fr-FR" dirty="0"/>
-              <a:t> devient le critère n°1 et le reste dans le temps.</a:t>
+              <a:t>devient le critère n°1 et le reste dans le temps.</a:t>
             </a:r>
           </a:p>
           <a:p>
@@ -6022,7 +6085,7 @@
             </a:r>
             <a:r>
               <a:rPr lang="fr-FR" dirty="0"/>
-              <a:t>, avec un recentrage sur l’attractivité physique après l’expérience.</a:t>
+              <a:t>, avec un recentrage sur la beauté après l’expérience.</a:t>
             </a:r>
           </a:p>
         </p:txBody>
@@ -6171,7 +6234,7 @@
           <a:p>
             <a:r>
               <a:rPr lang="fr-FR" b="1" dirty="0"/>
-              <a:t>Axe d'analyse n°2: est ce que la façon dont les participants s'auto évaluent a une incidence sur le fait d'avoir un match?</a:t>
+              <a:t>Axe d'analyse n°2: est ce que la façon dont les participants s'auto-évaluent a une incidence sur le fait d'avoir un match?</a:t>
             </a:r>
             <a:endParaRPr lang="fr-FR" dirty="0"/>
           </a:p>
@@ -6180,36 +6243,87 @@
           </a:p>
         </p:txBody>
       </p:sp>
-      <p:pic>
-        <p:nvPicPr>
-          <p:cNvPr id="8" name="Image 7" descr="Une image contenant texte, capture d’écran, diagramme, Caractère coloré&#10;&#10;Le contenu généré par l’IA peut être incorrect.">
-            <a:extLst>
-              <a:ext uri="{FF2B5EF4-FFF2-40B4-BE49-F238E27FC236}">
-                <a16:creationId xmlns:a16="http://schemas.microsoft.com/office/drawing/2014/main" id="{AF24C3E6-92D7-A61D-8F54-4FC90CC67925}"/>
-              </a:ext>
-            </a:extLst>
-          </p:cNvPr>
-          <p:cNvPicPr>
-            <a:picLocks noChangeAspect="1"/>
-          </p:cNvPicPr>
+      <p:grpSp>
+        <p:nvGrpSpPr>
+          <p:cNvPr id="12" name="Groupe 11">
+            <a:extLst>
+              <a:ext uri="{FF2B5EF4-FFF2-40B4-BE49-F238E27FC236}">
+                <a16:creationId xmlns:a16="http://schemas.microsoft.com/office/drawing/2014/main" id="{E4C68BC9-EDBF-19E3-9EF6-E880900FEDDC}"/>
+              </a:ext>
+            </a:extLst>
+          </p:cNvPr>
+          <p:cNvGrpSpPr/>
           <p:nvPr/>
-        </p:nvPicPr>
-        <p:blipFill>
-          <a:blip r:embed="rId2"/>
-          <a:stretch>
-            <a:fillRect/>
-          </a:stretch>
-        </p:blipFill>
-        <p:spPr>
+        </p:nvGrpSpPr>
+        <p:grpSpPr>
           <a:xfrm>
-            <a:off x="2189982" y="426713"/>
-            <a:ext cx="8831742" cy="6294762"/>
+            <a:off x="3488265" y="307856"/>
+            <a:ext cx="6475542" cy="6550143"/>
+            <a:chOff x="2568609" y="418216"/>
+            <a:chExt cx="5819818" cy="5690933"/>
           </a:xfrm>
-          <a:prstGeom prst="rect">
-            <a:avLst/>
-          </a:prstGeom>
-        </p:spPr>
-      </p:pic>
+        </p:grpSpPr>
+        <p:pic>
+          <p:nvPicPr>
+            <p:cNvPr id="5" name="Image 4" descr="Une image contenant texte, capture d’écran, ligne, Tracé&#10;&#10;Le contenu généré par l’IA peut être incorrect.">
+              <a:extLst>
+                <a:ext uri="{FF2B5EF4-FFF2-40B4-BE49-F238E27FC236}">
+                  <a16:creationId xmlns:a16="http://schemas.microsoft.com/office/drawing/2014/main" id="{FF1C3C7D-B05A-F40C-ABE3-69FE2404F03F}"/>
+                </a:ext>
+              </a:extLst>
+            </p:cNvPr>
+            <p:cNvPicPr>
+              <a:picLocks noChangeAspect="1"/>
+            </p:cNvPicPr>
+            <p:nvPr/>
+          </p:nvPicPr>
+          <p:blipFill>
+            <a:blip r:embed="rId2"/>
+            <a:stretch>
+              <a:fillRect/>
+            </a:stretch>
+          </p:blipFill>
+          <p:spPr>
+            <a:xfrm>
+              <a:off x="2568609" y="418216"/>
+              <a:ext cx="4743485" cy="2800370"/>
+            </a:xfrm>
+            <a:prstGeom prst="rect">
+              <a:avLst/>
+            </a:prstGeom>
+          </p:spPr>
+        </p:pic>
+        <p:pic>
+          <p:nvPicPr>
+            <p:cNvPr id="9" name="Image 8" descr="Une image contenant texte, capture d’écran, Tracé, diagramme&#10;&#10;Le contenu généré par l’IA peut être incorrect.">
+              <a:extLst>
+                <a:ext uri="{FF2B5EF4-FFF2-40B4-BE49-F238E27FC236}">
+                  <a16:creationId xmlns:a16="http://schemas.microsoft.com/office/drawing/2014/main" id="{A5BA9F2F-06C8-3D54-9434-B4F06F75C2DF}"/>
+                </a:ext>
+              </a:extLst>
+            </p:cNvPr>
+            <p:cNvPicPr>
+              <a:picLocks noChangeAspect="1"/>
+            </p:cNvPicPr>
+            <p:nvPr/>
+          </p:nvPicPr>
+          <p:blipFill>
+            <a:blip r:embed="rId3"/>
+            <a:stretch>
+              <a:fillRect/>
+            </a:stretch>
+          </p:blipFill>
+          <p:spPr>
+            <a:xfrm>
+              <a:off x="2568609" y="3337354"/>
+              <a:ext cx="5819818" cy="2771795"/>
+            </a:xfrm>
+            <a:prstGeom prst="rect">
+              <a:avLst/>
+            </a:prstGeom>
+          </p:spPr>
+        </p:pic>
+      </p:grpSp>
     </p:spTree>
     <p:extLst>
       <p:ext uri="{BB962C8B-B14F-4D97-AF65-F5344CB8AC3E}">
@@ -6346,7 +6460,7 @@
         </p:blipFill>
         <p:spPr>
           <a:xfrm>
-            <a:off x="1265274" y="0"/>
+            <a:off x="2233462" y="7616"/>
             <a:ext cx="4741401" cy="4248379"/>
           </a:xfrm>
           <a:prstGeom prst="rect">
@@ -6376,7 +6490,7 @@
         </p:blipFill>
         <p:spPr>
           <a:xfrm>
-            <a:off x="6478064" y="0"/>
+            <a:off x="7261191" y="7615"/>
             <a:ext cx="4741401" cy="4248379"/>
           </a:xfrm>
           <a:prstGeom prst="rect">
@@ -6805,7 +6919,7 @@
           <a:p>
             <a:r>
               <a:rPr lang="fr-FR" sz="1400" b="1" dirty="0"/>
-              <a:t>→ À retenir</a:t>
+              <a:t>→ À retenir:</a:t>
             </a:r>
             <a:r>
               <a:rPr lang="fr-FR" sz="1400" dirty="0"/>
@@ -6851,66 +6965,87 @@
           </a:p>
         </p:txBody>
       </p:sp>
-      <p:pic>
-        <p:nvPicPr>
-          <p:cNvPr id="11" name="Image 10" descr="Une image contenant texte, capture d’écran, cercle, diagramme&#10;&#10;Le contenu généré par l’IA peut être incorrect.">
-            <a:extLst>
-              <a:ext uri="{FF2B5EF4-FFF2-40B4-BE49-F238E27FC236}">
-                <a16:creationId xmlns:a16="http://schemas.microsoft.com/office/drawing/2014/main" id="{A362BF90-FDD3-E35C-6FBB-53FBCCFB606D}"/>
-              </a:ext>
-            </a:extLst>
-          </p:cNvPr>
-          <p:cNvPicPr>
-            <a:picLocks noChangeAspect="1"/>
-          </p:cNvPicPr>
+      <p:grpSp>
+        <p:nvGrpSpPr>
+          <p:cNvPr id="14" name="Groupe 13">
+            <a:extLst>
+              <a:ext uri="{FF2B5EF4-FFF2-40B4-BE49-F238E27FC236}">
+                <a16:creationId xmlns:a16="http://schemas.microsoft.com/office/drawing/2014/main" id="{683048E8-92A3-0832-D098-98B5AF6A8E97}"/>
+              </a:ext>
+            </a:extLst>
+          </p:cNvPr>
+          <p:cNvGrpSpPr/>
           <p:nvPr/>
-        </p:nvPicPr>
-        <p:blipFill>
-          <a:blip r:embed="rId2"/>
-          <a:stretch>
-            <a:fillRect/>
-          </a:stretch>
-        </p:blipFill>
-        <p:spPr>
+        </p:nvGrpSpPr>
+        <p:grpSpPr>
           <a:xfrm>
-            <a:off x="1707931" y="530351"/>
-            <a:ext cx="5076825" cy="4257675"/>
+            <a:off x="2257572" y="424099"/>
+            <a:ext cx="9451231" cy="3849738"/>
+            <a:chOff x="1902569" y="741450"/>
+            <a:chExt cx="9867900" cy="4257676"/>
           </a:xfrm>
-          <a:prstGeom prst="rect">
-            <a:avLst/>
-          </a:prstGeom>
-        </p:spPr>
-      </p:pic>
-      <p:pic>
-        <p:nvPicPr>
-          <p:cNvPr id="13" name="Image 12" descr="Une image contenant texte, capture d’écran, cercle, diagramme&#10;&#10;Le contenu généré par l’IA peut être incorrect.">
-            <a:extLst>
-              <a:ext uri="{FF2B5EF4-FFF2-40B4-BE49-F238E27FC236}">
-                <a16:creationId xmlns:a16="http://schemas.microsoft.com/office/drawing/2014/main" id="{2427A6EF-7D40-E654-0564-BAD6FB339CE3}"/>
-              </a:ext>
-            </a:extLst>
-          </p:cNvPr>
-          <p:cNvPicPr>
-            <a:picLocks noChangeAspect="1"/>
-          </p:cNvPicPr>
-          <p:nvPr/>
-        </p:nvPicPr>
-        <p:blipFill>
-          <a:blip r:embed="rId3"/>
-          <a:stretch>
-            <a:fillRect/>
-          </a:stretch>
-        </p:blipFill>
-        <p:spPr>
-          <a:xfrm>
-            <a:off x="7461504" y="525616"/>
-            <a:ext cx="3714750" cy="4257675"/>
-          </a:xfrm>
-          <a:prstGeom prst="rect">
-            <a:avLst/>
-          </a:prstGeom>
-        </p:spPr>
-      </p:pic>
+        </p:grpSpPr>
+        <p:pic>
+          <p:nvPicPr>
+            <p:cNvPr id="6" name="Image 5" descr="Une image contenant texte, capture d’écran, cercle, diagramme&#10;&#10;Le contenu généré par l’IA peut être incorrect.">
+              <a:extLst>
+                <a:ext uri="{FF2B5EF4-FFF2-40B4-BE49-F238E27FC236}">
+                  <a16:creationId xmlns:a16="http://schemas.microsoft.com/office/drawing/2014/main" id="{8A9D5C53-A29A-E1B7-9156-F2BDA8452A74}"/>
+                </a:ext>
+              </a:extLst>
+            </p:cNvPr>
+            <p:cNvPicPr>
+              <a:picLocks noChangeAspect="1"/>
+            </p:cNvPicPr>
+            <p:nvPr/>
+          </p:nvPicPr>
+          <p:blipFill>
+            <a:blip r:embed="rId2"/>
+            <a:stretch>
+              <a:fillRect/>
+            </a:stretch>
+          </p:blipFill>
+          <p:spPr>
+            <a:xfrm>
+              <a:off x="1902569" y="741451"/>
+              <a:ext cx="5076825" cy="4257675"/>
+            </a:xfrm>
+            <a:prstGeom prst="rect">
+              <a:avLst/>
+            </a:prstGeom>
+          </p:spPr>
+        </p:pic>
+        <p:pic>
+          <p:nvPicPr>
+            <p:cNvPr id="12" name="Image 11" descr="Une image contenant texte, capture d’écran, cercle, Police&#10;&#10;Le contenu généré par l’IA peut être incorrect.">
+              <a:extLst>
+                <a:ext uri="{FF2B5EF4-FFF2-40B4-BE49-F238E27FC236}">
+                  <a16:creationId xmlns:a16="http://schemas.microsoft.com/office/drawing/2014/main" id="{64E4CA8A-E6C8-9646-D897-F24AC7C34C32}"/>
+                </a:ext>
+              </a:extLst>
+            </p:cNvPr>
+            <p:cNvPicPr>
+              <a:picLocks noChangeAspect="1"/>
+            </p:cNvPicPr>
+            <p:nvPr/>
+          </p:nvPicPr>
+          <p:blipFill>
+            <a:blip r:embed="rId3"/>
+            <a:stretch>
+              <a:fillRect/>
+            </a:stretch>
+          </p:blipFill>
+          <p:spPr>
+            <a:xfrm>
+              <a:off x="6979394" y="741450"/>
+              <a:ext cx="4791075" cy="4257675"/>
+            </a:xfrm>
+            <a:prstGeom prst="rect">
+              <a:avLst/>
+            </a:prstGeom>
+          </p:spPr>
+        </p:pic>
+      </p:grpSp>
     </p:spTree>
     <p:extLst>
       <p:ext uri="{BB962C8B-B14F-4D97-AF65-F5344CB8AC3E}">
@@ -6949,10 +7084,10 @@
       </p:grpSpPr>
       <p:pic>
         <p:nvPicPr>
-          <p:cNvPr id="8" name="Image 7" descr="Une image contenant cercle, diagramme, texte, capture d’écran&#10;&#10;Le contenu généré par l’IA peut être incorrect.">
-            <a:extLst>
-              <a:ext uri="{FF2B5EF4-FFF2-40B4-BE49-F238E27FC236}">
-                <a16:creationId xmlns:a16="http://schemas.microsoft.com/office/drawing/2014/main" id="{E14A8DEE-F401-BF93-A489-95253455EB19}"/>
+          <p:cNvPr id="6" name="Image 5" descr="Une image contenant cercle, texte, diagramme, capture d’écran&#10;&#10;Le contenu généré par l’IA peut être incorrect.">
+            <a:extLst>
+              <a:ext uri="{FF2B5EF4-FFF2-40B4-BE49-F238E27FC236}">
+                <a16:creationId xmlns:a16="http://schemas.microsoft.com/office/drawing/2014/main" id="{8457C655-4FEA-F050-7909-718C49676833}"/>
               </a:ext>
             </a:extLst>
           </p:cNvPr>
@@ -6969,8 +7104,8 @@
         </p:blipFill>
         <p:spPr>
           <a:xfrm>
-            <a:off x="2838761" y="602471"/>
-            <a:ext cx="8800185" cy="6285050"/>
+            <a:off x="2785263" y="618988"/>
+            <a:ext cx="8753931" cy="6252015"/>
           </a:xfrm>
           <a:prstGeom prst="rect">
             <a:avLst/>

</xml_diff>